<commit_message>
changed the figure 3 and added the links
</commit_message>
<xml_diff>
--- a/tutorials/pipelines/tut_a_st_bud/vector files/fig02.pptx
+++ b/tutorials/pipelines/tut_a_st_bud/vector files/fig02.pptx
@@ -2,12 +2,12 @@
 <file path=ppt/presentation.xml><?xml version="1.0" encoding="utf-8"?>
 <p:presentation xmlns:a="http://schemas.openxmlformats.org/drawingml/2006/main" xmlns:r="http://schemas.openxmlformats.org/officeDocument/2006/relationships" xmlns:p="http://schemas.openxmlformats.org/presentationml/2006/main" saveSubsetFonts="1">
   <p:sldMasterIdLst>
-    <p:sldMasterId id="2147483708" r:id="rId1"/>
+    <p:sldMasterId id="2147483804" r:id="rId1"/>
   </p:sldMasterIdLst>
   <p:sldIdLst>
     <p:sldId id="256" r:id="rId2"/>
   </p:sldIdLst>
-  <p:sldSz cx="18000663" cy="10799763"/>
+  <p:sldSz cx="16200438" cy="10799763"/>
   <p:notesSz cx="6858000" cy="9144000"/>
   <p:defaultTextStyle>
     <a:defPPr>
@@ -141,15 +141,15 @@
         </p:nvSpPr>
         <p:spPr>
           <a:xfrm>
-            <a:off x="2250083" y="1767462"/>
-            <a:ext cx="13500497" cy="3759917"/>
+            <a:off x="1215033" y="1767462"/>
+            <a:ext cx="13770372" cy="3759917"/>
           </a:xfrm>
         </p:spPr>
         <p:txBody>
           <a:bodyPr anchor="b"/>
           <a:lstStyle>
             <a:lvl1pPr algn="ctr">
-              <a:defRPr sz="8858"/>
+              <a:defRPr sz="9449"/>
             </a:lvl1pPr>
           </a:lstStyle>
           <a:p>
@@ -173,8 +173,8 @@
         </p:nvSpPr>
         <p:spPr>
           <a:xfrm>
-            <a:off x="2250083" y="5672376"/>
-            <a:ext cx="13500497" cy="2607442"/>
+            <a:off x="2025055" y="5672376"/>
+            <a:ext cx="12150329" cy="2607442"/>
           </a:xfrm>
         </p:spPr>
         <p:txBody>
@@ -182,39 +182,39 @@
           <a:lstStyle>
             <a:lvl1pPr marL="0" indent="0" algn="ctr">
               <a:buNone/>
-              <a:defRPr sz="3543"/>
+              <a:defRPr sz="3780"/>
             </a:lvl1pPr>
-            <a:lvl2pPr marL="675010" indent="0" algn="ctr">
-              <a:buNone/>
-              <a:defRPr sz="2953"/>
+            <a:lvl2pPr marL="719999" indent="0" algn="ctr">
+              <a:buNone/>
+              <a:defRPr sz="3150"/>
             </a:lvl2pPr>
-            <a:lvl3pPr marL="1350020" indent="0" algn="ctr">
-              <a:buNone/>
-              <a:defRPr sz="2658"/>
+            <a:lvl3pPr marL="1439997" indent="0" algn="ctr">
+              <a:buNone/>
+              <a:defRPr sz="2835"/>
             </a:lvl3pPr>
-            <a:lvl4pPr marL="2025030" indent="0" algn="ctr">
-              <a:buNone/>
-              <a:defRPr sz="2362"/>
+            <a:lvl4pPr marL="2159996" indent="0" algn="ctr">
+              <a:buNone/>
+              <a:defRPr sz="2520"/>
             </a:lvl4pPr>
-            <a:lvl5pPr marL="2700040" indent="0" algn="ctr">
-              <a:buNone/>
-              <a:defRPr sz="2362"/>
+            <a:lvl5pPr marL="2879994" indent="0" algn="ctr">
+              <a:buNone/>
+              <a:defRPr sz="2520"/>
             </a:lvl5pPr>
-            <a:lvl6pPr marL="3375050" indent="0" algn="ctr">
-              <a:buNone/>
-              <a:defRPr sz="2362"/>
+            <a:lvl6pPr marL="3599993" indent="0" algn="ctr">
+              <a:buNone/>
+              <a:defRPr sz="2520"/>
             </a:lvl6pPr>
-            <a:lvl7pPr marL="4050060" indent="0" algn="ctr">
-              <a:buNone/>
-              <a:defRPr sz="2362"/>
+            <a:lvl7pPr marL="4319991" indent="0" algn="ctr">
+              <a:buNone/>
+              <a:defRPr sz="2520"/>
             </a:lvl7pPr>
-            <a:lvl8pPr marL="4725071" indent="0" algn="ctr">
-              <a:buNone/>
-              <a:defRPr sz="2362"/>
+            <a:lvl8pPr marL="5039990" indent="0" algn="ctr">
+              <a:buNone/>
+              <a:defRPr sz="2520"/>
             </a:lvl8pPr>
-            <a:lvl9pPr marL="5400081" indent="0" algn="ctr">
-              <a:buNone/>
-              <a:defRPr sz="2362"/>
+            <a:lvl9pPr marL="5759988" indent="0" algn="ctr">
+              <a:buNone/>
+              <a:defRPr sz="2520"/>
             </a:lvl9pPr>
           </a:lstStyle>
           <a:p>
@@ -243,7 +243,7 @@
           <a:p>
             <a:fld id="{CA1BB51F-BFC6-4DD3-8C2A-5B21FD6F69C3}" type="datetimeFigureOut">
               <a:rPr lang="en-SE" smtClean="0"/>
-              <a:t>10/04/2023</a:t>
+              <a:t>10/03/2023</a:t>
             </a:fld>
             <a:endParaRPr lang="en-SE"/>
           </a:p>
@@ -294,7 +294,7 @@
     </p:spTree>
     <p:extLst>
       <p:ext uri="{BB962C8B-B14F-4D97-AF65-F5344CB8AC3E}">
-        <p14:creationId xmlns:p14="http://schemas.microsoft.com/office/powerpoint/2010/main" val="4078208548"/>
+        <p14:creationId xmlns:p14="http://schemas.microsoft.com/office/powerpoint/2010/main" val="3696400578"/>
       </p:ext>
     </p:extLst>
   </p:cSld>
@@ -413,7 +413,7 @@
           <a:p>
             <a:fld id="{CA1BB51F-BFC6-4DD3-8C2A-5B21FD6F69C3}" type="datetimeFigureOut">
               <a:rPr lang="en-SE" smtClean="0"/>
-              <a:t>10/04/2023</a:t>
+              <a:t>10/03/2023</a:t>
             </a:fld>
             <a:endParaRPr lang="en-SE"/>
           </a:p>
@@ -464,7 +464,7 @@
     </p:spTree>
     <p:extLst>
       <p:ext uri="{BB962C8B-B14F-4D97-AF65-F5344CB8AC3E}">
-        <p14:creationId xmlns:p14="http://schemas.microsoft.com/office/powerpoint/2010/main" val="2455675841"/>
+        <p14:creationId xmlns:p14="http://schemas.microsoft.com/office/powerpoint/2010/main" val="2593950287"/>
       </p:ext>
     </p:extLst>
   </p:cSld>
@@ -503,8 +503,8 @@
         </p:nvSpPr>
         <p:spPr>
           <a:xfrm>
-            <a:off x="12881724" y="574987"/>
-            <a:ext cx="3881393" cy="9152300"/>
+            <a:off x="11593440" y="574987"/>
+            <a:ext cx="3493219" cy="9152300"/>
           </a:xfrm>
         </p:spPr>
         <p:txBody>
@@ -531,8 +531,8 @@
         </p:nvSpPr>
         <p:spPr>
           <a:xfrm>
-            <a:off x="1237545" y="574987"/>
-            <a:ext cx="11419171" cy="9152300"/>
+            <a:off x="1113781" y="574987"/>
+            <a:ext cx="10277153" cy="9152300"/>
           </a:xfrm>
         </p:spPr>
         <p:txBody>
@@ -593,7 +593,7 @@
           <a:p>
             <a:fld id="{CA1BB51F-BFC6-4DD3-8C2A-5B21FD6F69C3}" type="datetimeFigureOut">
               <a:rPr lang="en-SE" smtClean="0"/>
-              <a:t>10/04/2023</a:t>
+              <a:t>10/03/2023</a:t>
             </a:fld>
             <a:endParaRPr lang="en-SE"/>
           </a:p>
@@ -644,7 +644,7 @@
     </p:spTree>
     <p:extLst>
       <p:ext uri="{BB962C8B-B14F-4D97-AF65-F5344CB8AC3E}">
-        <p14:creationId xmlns:p14="http://schemas.microsoft.com/office/powerpoint/2010/main" val="3710561023"/>
+        <p14:creationId xmlns:p14="http://schemas.microsoft.com/office/powerpoint/2010/main" val="4133536035"/>
       </p:ext>
     </p:extLst>
   </p:cSld>
@@ -763,7 +763,7 @@
           <a:p>
             <a:fld id="{CA1BB51F-BFC6-4DD3-8C2A-5B21FD6F69C3}" type="datetimeFigureOut">
               <a:rPr lang="en-SE" smtClean="0"/>
-              <a:t>10/04/2023</a:t>
+              <a:t>10/03/2023</a:t>
             </a:fld>
             <a:endParaRPr lang="en-SE"/>
           </a:p>
@@ -814,7 +814,7 @@
     </p:spTree>
     <p:extLst>
       <p:ext uri="{BB962C8B-B14F-4D97-AF65-F5344CB8AC3E}">
-        <p14:creationId xmlns:p14="http://schemas.microsoft.com/office/powerpoint/2010/main" val="1770444985"/>
+        <p14:creationId xmlns:p14="http://schemas.microsoft.com/office/powerpoint/2010/main" val="3221198740"/>
       </p:ext>
     </p:extLst>
   </p:cSld>
@@ -853,15 +853,15 @@
         </p:nvSpPr>
         <p:spPr>
           <a:xfrm>
-            <a:off x="1228170" y="2692442"/>
-            <a:ext cx="15525572" cy="4492401"/>
+            <a:off x="1105343" y="2692444"/>
+            <a:ext cx="13972878" cy="4492401"/>
           </a:xfrm>
         </p:spPr>
         <p:txBody>
           <a:bodyPr anchor="b"/>
           <a:lstStyle>
             <a:lvl1pPr>
-              <a:defRPr sz="8858"/>
+              <a:defRPr sz="9449"/>
             </a:lvl1pPr>
           </a:lstStyle>
           <a:p>
@@ -885,8 +885,8 @@
         </p:nvSpPr>
         <p:spPr>
           <a:xfrm>
-            <a:off x="1228170" y="7227343"/>
-            <a:ext cx="15525572" cy="2362447"/>
+            <a:off x="1105343" y="7227345"/>
+            <a:ext cx="13972878" cy="2362447"/>
           </a:xfrm>
         </p:spPr>
         <p:txBody>
@@ -894,17 +894,15 @@
           <a:lstStyle>
             <a:lvl1pPr marL="0" indent="0">
               <a:buNone/>
-              <a:defRPr sz="3543">
+              <a:defRPr sz="3780">
                 <a:solidFill>
-                  <a:schemeClr val="tx1">
-                    <a:tint val="75000"/>
-                  </a:schemeClr>
+                  <a:schemeClr val="tx1"/>
                 </a:solidFill>
               </a:defRPr>
             </a:lvl1pPr>
-            <a:lvl2pPr marL="675010" indent="0">
-              <a:buNone/>
-              <a:defRPr sz="2953">
+            <a:lvl2pPr marL="719999" indent="0">
+              <a:buNone/>
+              <a:defRPr sz="3150">
                 <a:solidFill>
                   <a:schemeClr val="tx1">
                     <a:tint val="75000"/>
@@ -912,9 +910,9 @@
                 </a:solidFill>
               </a:defRPr>
             </a:lvl2pPr>
-            <a:lvl3pPr marL="1350020" indent="0">
-              <a:buNone/>
-              <a:defRPr sz="2658">
+            <a:lvl3pPr marL="1439997" indent="0">
+              <a:buNone/>
+              <a:defRPr sz="2835">
                 <a:solidFill>
                   <a:schemeClr val="tx1">
                     <a:tint val="75000"/>
@@ -922,9 +920,9 @@
                 </a:solidFill>
               </a:defRPr>
             </a:lvl3pPr>
-            <a:lvl4pPr marL="2025030" indent="0">
-              <a:buNone/>
-              <a:defRPr sz="2362">
+            <a:lvl4pPr marL="2159996" indent="0">
+              <a:buNone/>
+              <a:defRPr sz="2520">
                 <a:solidFill>
                   <a:schemeClr val="tx1">
                     <a:tint val="75000"/>
@@ -932,9 +930,9 @@
                 </a:solidFill>
               </a:defRPr>
             </a:lvl4pPr>
-            <a:lvl5pPr marL="2700040" indent="0">
-              <a:buNone/>
-              <a:defRPr sz="2362">
+            <a:lvl5pPr marL="2879994" indent="0">
+              <a:buNone/>
+              <a:defRPr sz="2520">
                 <a:solidFill>
                   <a:schemeClr val="tx1">
                     <a:tint val="75000"/>
@@ -942,9 +940,9 @@
                 </a:solidFill>
               </a:defRPr>
             </a:lvl5pPr>
-            <a:lvl6pPr marL="3375050" indent="0">
-              <a:buNone/>
-              <a:defRPr sz="2362">
+            <a:lvl6pPr marL="3599993" indent="0">
+              <a:buNone/>
+              <a:defRPr sz="2520">
                 <a:solidFill>
                   <a:schemeClr val="tx1">
                     <a:tint val="75000"/>
@@ -952,9 +950,9 @@
                 </a:solidFill>
               </a:defRPr>
             </a:lvl6pPr>
-            <a:lvl7pPr marL="4050060" indent="0">
-              <a:buNone/>
-              <a:defRPr sz="2362">
+            <a:lvl7pPr marL="4319991" indent="0">
+              <a:buNone/>
+              <a:defRPr sz="2520">
                 <a:solidFill>
                   <a:schemeClr val="tx1">
                     <a:tint val="75000"/>
@@ -962,9 +960,9 @@
                 </a:solidFill>
               </a:defRPr>
             </a:lvl7pPr>
-            <a:lvl8pPr marL="4725071" indent="0">
-              <a:buNone/>
-              <a:defRPr sz="2362">
+            <a:lvl8pPr marL="5039990" indent="0">
+              <a:buNone/>
+              <a:defRPr sz="2520">
                 <a:solidFill>
                   <a:schemeClr val="tx1">
                     <a:tint val="75000"/>
@@ -972,9 +970,9 @@
                 </a:solidFill>
               </a:defRPr>
             </a:lvl8pPr>
-            <a:lvl9pPr marL="5400081" indent="0">
-              <a:buNone/>
-              <a:defRPr sz="2362">
+            <a:lvl9pPr marL="5759988" indent="0">
+              <a:buNone/>
+              <a:defRPr sz="2520">
                 <a:solidFill>
                   <a:schemeClr val="tx1">
                     <a:tint val="75000"/>
@@ -1009,7 +1007,7 @@
           <a:p>
             <a:fld id="{CA1BB51F-BFC6-4DD3-8C2A-5B21FD6F69C3}" type="datetimeFigureOut">
               <a:rPr lang="en-SE" smtClean="0"/>
-              <a:t>10/04/2023</a:t>
+              <a:t>10/03/2023</a:t>
             </a:fld>
             <a:endParaRPr lang="en-SE"/>
           </a:p>
@@ -1060,7 +1058,7 @@
     </p:spTree>
     <p:extLst>
       <p:ext uri="{BB962C8B-B14F-4D97-AF65-F5344CB8AC3E}">
-        <p14:creationId xmlns:p14="http://schemas.microsoft.com/office/powerpoint/2010/main" val="234299590"/>
+        <p14:creationId xmlns:p14="http://schemas.microsoft.com/office/powerpoint/2010/main" val="3829778283"/>
       </p:ext>
     </p:extLst>
   </p:cSld>
@@ -1122,8 +1120,8 @@
         </p:nvSpPr>
         <p:spPr>
           <a:xfrm>
-            <a:off x="1237545" y="2874937"/>
-            <a:ext cx="7650282" cy="6852350"/>
+            <a:off x="1113780" y="2874937"/>
+            <a:ext cx="6885186" cy="6852350"/>
           </a:xfrm>
         </p:spPr>
         <p:txBody>
@@ -1179,8 +1177,8 @@
         </p:nvSpPr>
         <p:spPr>
           <a:xfrm>
-            <a:off x="9112836" y="2874937"/>
-            <a:ext cx="7650282" cy="6852350"/>
+            <a:off x="8201472" y="2874937"/>
+            <a:ext cx="6885186" cy="6852350"/>
           </a:xfrm>
         </p:spPr>
         <p:txBody>
@@ -1241,7 +1239,7 @@
           <a:p>
             <a:fld id="{CA1BB51F-BFC6-4DD3-8C2A-5B21FD6F69C3}" type="datetimeFigureOut">
               <a:rPr lang="en-SE" smtClean="0"/>
-              <a:t>10/04/2023</a:t>
+              <a:t>10/03/2023</a:t>
             </a:fld>
             <a:endParaRPr lang="en-SE"/>
           </a:p>
@@ -1292,7 +1290,7 @@
     </p:spTree>
     <p:extLst>
       <p:ext uri="{BB962C8B-B14F-4D97-AF65-F5344CB8AC3E}">
-        <p14:creationId xmlns:p14="http://schemas.microsoft.com/office/powerpoint/2010/main" val="4046673270"/>
+        <p14:creationId xmlns:p14="http://schemas.microsoft.com/office/powerpoint/2010/main" val="1067763475"/>
       </p:ext>
     </p:extLst>
   </p:cSld>
@@ -1331,8 +1329,8 @@
         </p:nvSpPr>
         <p:spPr>
           <a:xfrm>
-            <a:off x="1239890" y="574988"/>
-            <a:ext cx="15525572" cy="2087455"/>
+            <a:off x="1115890" y="574990"/>
+            <a:ext cx="13972878" cy="2087455"/>
           </a:xfrm>
         </p:spPr>
         <p:txBody>
@@ -1359,8 +1357,8 @@
         </p:nvSpPr>
         <p:spPr>
           <a:xfrm>
-            <a:off x="1239891" y="2647443"/>
-            <a:ext cx="7615123" cy="1297471"/>
+            <a:off x="1115892" y="2647443"/>
+            <a:ext cx="6853544" cy="1297471"/>
           </a:xfrm>
         </p:spPr>
         <p:txBody>
@@ -1368,39 +1366,39 @@
           <a:lstStyle>
             <a:lvl1pPr marL="0" indent="0">
               <a:buNone/>
-              <a:defRPr sz="3543" b="1"/>
+              <a:defRPr sz="3780" b="1"/>
             </a:lvl1pPr>
-            <a:lvl2pPr marL="675010" indent="0">
-              <a:buNone/>
-              <a:defRPr sz="2953" b="1"/>
+            <a:lvl2pPr marL="719999" indent="0">
+              <a:buNone/>
+              <a:defRPr sz="3150" b="1"/>
             </a:lvl2pPr>
-            <a:lvl3pPr marL="1350020" indent="0">
-              <a:buNone/>
-              <a:defRPr sz="2658" b="1"/>
+            <a:lvl3pPr marL="1439997" indent="0">
+              <a:buNone/>
+              <a:defRPr sz="2835" b="1"/>
             </a:lvl3pPr>
-            <a:lvl4pPr marL="2025030" indent="0">
-              <a:buNone/>
-              <a:defRPr sz="2362" b="1"/>
+            <a:lvl4pPr marL="2159996" indent="0">
+              <a:buNone/>
+              <a:defRPr sz="2520" b="1"/>
             </a:lvl4pPr>
-            <a:lvl5pPr marL="2700040" indent="0">
-              <a:buNone/>
-              <a:defRPr sz="2362" b="1"/>
+            <a:lvl5pPr marL="2879994" indent="0">
+              <a:buNone/>
+              <a:defRPr sz="2520" b="1"/>
             </a:lvl5pPr>
-            <a:lvl6pPr marL="3375050" indent="0">
-              <a:buNone/>
-              <a:defRPr sz="2362" b="1"/>
+            <a:lvl6pPr marL="3599993" indent="0">
+              <a:buNone/>
+              <a:defRPr sz="2520" b="1"/>
             </a:lvl6pPr>
-            <a:lvl7pPr marL="4050060" indent="0">
-              <a:buNone/>
-              <a:defRPr sz="2362" b="1"/>
+            <a:lvl7pPr marL="4319991" indent="0">
+              <a:buNone/>
+              <a:defRPr sz="2520" b="1"/>
             </a:lvl7pPr>
-            <a:lvl8pPr marL="4725071" indent="0">
-              <a:buNone/>
-              <a:defRPr sz="2362" b="1"/>
+            <a:lvl8pPr marL="5039990" indent="0">
+              <a:buNone/>
+              <a:defRPr sz="2520" b="1"/>
             </a:lvl8pPr>
-            <a:lvl9pPr marL="5400081" indent="0">
-              <a:buNone/>
-              <a:defRPr sz="2362" b="1"/>
+            <a:lvl9pPr marL="5759988" indent="0">
+              <a:buNone/>
+              <a:defRPr sz="2520" b="1"/>
             </a:lvl9pPr>
           </a:lstStyle>
           <a:p>
@@ -1424,8 +1422,8 @@
         </p:nvSpPr>
         <p:spPr>
           <a:xfrm>
-            <a:off x="1239891" y="3944914"/>
-            <a:ext cx="7615123" cy="5802373"/>
+            <a:off x="1115892" y="3944914"/>
+            <a:ext cx="6853544" cy="5802373"/>
           </a:xfrm>
         </p:spPr>
         <p:txBody>
@@ -1481,8 +1479,8 @@
         </p:nvSpPr>
         <p:spPr>
           <a:xfrm>
-            <a:off x="9112836" y="2647443"/>
-            <a:ext cx="7652626" cy="1297471"/>
+            <a:off x="8201473" y="2647443"/>
+            <a:ext cx="6887296" cy="1297471"/>
           </a:xfrm>
         </p:spPr>
         <p:txBody>
@@ -1490,39 +1488,39 @@
           <a:lstStyle>
             <a:lvl1pPr marL="0" indent="0">
               <a:buNone/>
-              <a:defRPr sz="3543" b="1"/>
+              <a:defRPr sz="3780" b="1"/>
             </a:lvl1pPr>
-            <a:lvl2pPr marL="675010" indent="0">
-              <a:buNone/>
-              <a:defRPr sz="2953" b="1"/>
+            <a:lvl2pPr marL="719999" indent="0">
+              <a:buNone/>
+              <a:defRPr sz="3150" b="1"/>
             </a:lvl2pPr>
-            <a:lvl3pPr marL="1350020" indent="0">
-              <a:buNone/>
-              <a:defRPr sz="2658" b="1"/>
+            <a:lvl3pPr marL="1439997" indent="0">
+              <a:buNone/>
+              <a:defRPr sz="2835" b="1"/>
             </a:lvl3pPr>
-            <a:lvl4pPr marL="2025030" indent="0">
-              <a:buNone/>
-              <a:defRPr sz="2362" b="1"/>
+            <a:lvl4pPr marL="2159996" indent="0">
+              <a:buNone/>
+              <a:defRPr sz="2520" b="1"/>
             </a:lvl4pPr>
-            <a:lvl5pPr marL="2700040" indent="0">
-              <a:buNone/>
-              <a:defRPr sz="2362" b="1"/>
+            <a:lvl5pPr marL="2879994" indent="0">
+              <a:buNone/>
+              <a:defRPr sz="2520" b="1"/>
             </a:lvl5pPr>
-            <a:lvl6pPr marL="3375050" indent="0">
-              <a:buNone/>
-              <a:defRPr sz="2362" b="1"/>
+            <a:lvl6pPr marL="3599993" indent="0">
+              <a:buNone/>
+              <a:defRPr sz="2520" b="1"/>
             </a:lvl6pPr>
-            <a:lvl7pPr marL="4050060" indent="0">
-              <a:buNone/>
-              <a:defRPr sz="2362" b="1"/>
+            <a:lvl7pPr marL="4319991" indent="0">
+              <a:buNone/>
+              <a:defRPr sz="2520" b="1"/>
             </a:lvl7pPr>
-            <a:lvl8pPr marL="4725071" indent="0">
-              <a:buNone/>
-              <a:defRPr sz="2362" b="1"/>
+            <a:lvl8pPr marL="5039990" indent="0">
+              <a:buNone/>
+              <a:defRPr sz="2520" b="1"/>
             </a:lvl8pPr>
-            <a:lvl9pPr marL="5400081" indent="0">
-              <a:buNone/>
-              <a:defRPr sz="2362" b="1"/>
+            <a:lvl9pPr marL="5759988" indent="0">
+              <a:buNone/>
+              <a:defRPr sz="2520" b="1"/>
             </a:lvl9pPr>
           </a:lstStyle>
           <a:p>
@@ -1546,8 +1544,8 @@
         </p:nvSpPr>
         <p:spPr>
           <a:xfrm>
-            <a:off x="9112836" y="3944914"/>
-            <a:ext cx="7652626" cy="5802373"/>
+            <a:off x="8201473" y="3944914"/>
+            <a:ext cx="6887296" cy="5802373"/>
           </a:xfrm>
         </p:spPr>
         <p:txBody>
@@ -1608,7 +1606,7 @@
           <a:p>
             <a:fld id="{CA1BB51F-BFC6-4DD3-8C2A-5B21FD6F69C3}" type="datetimeFigureOut">
               <a:rPr lang="en-SE" smtClean="0"/>
-              <a:t>10/04/2023</a:t>
+              <a:t>10/03/2023</a:t>
             </a:fld>
             <a:endParaRPr lang="en-SE"/>
           </a:p>
@@ -1659,7 +1657,7 @@
     </p:spTree>
     <p:extLst>
       <p:ext uri="{BB962C8B-B14F-4D97-AF65-F5344CB8AC3E}">
-        <p14:creationId xmlns:p14="http://schemas.microsoft.com/office/powerpoint/2010/main" val="3739084117"/>
+        <p14:creationId xmlns:p14="http://schemas.microsoft.com/office/powerpoint/2010/main" val="30725175"/>
       </p:ext>
     </p:extLst>
   </p:cSld>
@@ -1726,7 +1724,7 @@
           <a:p>
             <a:fld id="{CA1BB51F-BFC6-4DD3-8C2A-5B21FD6F69C3}" type="datetimeFigureOut">
               <a:rPr lang="en-SE" smtClean="0"/>
-              <a:t>10/04/2023</a:t>
+              <a:t>10/03/2023</a:t>
             </a:fld>
             <a:endParaRPr lang="en-SE"/>
           </a:p>
@@ -1777,7 +1775,7 @@
     </p:spTree>
     <p:extLst>
       <p:ext uri="{BB962C8B-B14F-4D97-AF65-F5344CB8AC3E}">
-        <p14:creationId xmlns:p14="http://schemas.microsoft.com/office/powerpoint/2010/main" val="3210855568"/>
+        <p14:creationId xmlns:p14="http://schemas.microsoft.com/office/powerpoint/2010/main" val="3829716986"/>
       </p:ext>
     </p:extLst>
   </p:cSld>
@@ -1821,7 +1819,7 @@
           <a:p>
             <a:fld id="{CA1BB51F-BFC6-4DD3-8C2A-5B21FD6F69C3}" type="datetimeFigureOut">
               <a:rPr lang="en-SE" smtClean="0"/>
-              <a:t>10/04/2023</a:t>
+              <a:t>10/03/2023</a:t>
             </a:fld>
             <a:endParaRPr lang="en-SE"/>
           </a:p>
@@ -1872,7 +1870,7 @@
     </p:spTree>
     <p:extLst>
       <p:ext uri="{BB962C8B-B14F-4D97-AF65-F5344CB8AC3E}">
-        <p14:creationId xmlns:p14="http://schemas.microsoft.com/office/powerpoint/2010/main" val="3350527425"/>
+        <p14:creationId xmlns:p14="http://schemas.microsoft.com/office/powerpoint/2010/main" val="2300022888"/>
       </p:ext>
     </p:extLst>
   </p:cSld>
@@ -1911,15 +1909,15 @@
         </p:nvSpPr>
         <p:spPr>
           <a:xfrm>
-            <a:off x="1239891" y="719984"/>
-            <a:ext cx="5805682" cy="2519945"/>
+            <a:off x="1115890" y="719984"/>
+            <a:ext cx="5225063" cy="2519945"/>
           </a:xfrm>
         </p:spPr>
         <p:txBody>
           <a:bodyPr anchor="b"/>
           <a:lstStyle>
             <a:lvl1pPr>
-              <a:defRPr sz="4724"/>
+              <a:defRPr sz="5039"/>
             </a:lvl1pPr>
           </a:lstStyle>
           <a:p>
@@ -1943,39 +1941,39 @@
         </p:nvSpPr>
         <p:spPr>
           <a:xfrm>
-            <a:off x="7652626" y="1554966"/>
-            <a:ext cx="9112836" cy="7674832"/>
+            <a:off x="6887296" y="1554968"/>
+            <a:ext cx="8201472" cy="7674832"/>
           </a:xfrm>
         </p:spPr>
         <p:txBody>
           <a:bodyPr/>
           <a:lstStyle>
             <a:lvl1pPr>
-              <a:defRPr sz="4724"/>
+              <a:defRPr sz="5039"/>
             </a:lvl1pPr>
             <a:lvl2pPr>
-              <a:defRPr sz="4134"/>
+              <a:defRPr sz="4409"/>
             </a:lvl2pPr>
             <a:lvl3pPr>
-              <a:defRPr sz="3543"/>
+              <a:defRPr sz="3780"/>
             </a:lvl3pPr>
             <a:lvl4pPr>
-              <a:defRPr sz="2953"/>
+              <a:defRPr sz="3150"/>
             </a:lvl4pPr>
             <a:lvl5pPr>
-              <a:defRPr sz="2953"/>
+              <a:defRPr sz="3150"/>
             </a:lvl5pPr>
             <a:lvl6pPr>
-              <a:defRPr sz="2953"/>
+              <a:defRPr sz="3150"/>
             </a:lvl6pPr>
             <a:lvl7pPr>
-              <a:defRPr sz="2953"/>
+              <a:defRPr sz="3150"/>
             </a:lvl7pPr>
             <a:lvl8pPr>
-              <a:defRPr sz="2953"/>
+              <a:defRPr sz="3150"/>
             </a:lvl8pPr>
             <a:lvl9pPr>
-              <a:defRPr sz="2953"/>
+              <a:defRPr sz="3150"/>
             </a:lvl9pPr>
           </a:lstStyle>
           <a:p>
@@ -2028,8 +2026,8 @@
         </p:nvSpPr>
         <p:spPr>
           <a:xfrm>
-            <a:off x="1239891" y="3239929"/>
-            <a:ext cx="5805682" cy="6002369"/>
+            <a:off x="1115890" y="3239929"/>
+            <a:ext cx="5225063" cy="6002369"/>
           </a:xfrm>
         </p:spPr>
         <p:txBody>
@@ -2037,39 +2035,39 @@
           <a:lstStyle>
             <a:lvl1pPr marL="0" indent="0">
               <a:buNone/>
-              <a:defRPr sz="2362"/>
+              <a:defRPr sz="2520"/>
             </a:lvl1pPr>
-            <a:lvl2pPr marL="675010" indent="0">
-              <a:buNone/>
-              <a:defRPr sz="2067"/>
+            <a:lvl2pPr marL="719999" indent="0">
+              <a:buNone/>
+              <a:defRPr sz="2205"/>
             </a:lvl2pPr>
-            <a:lvl3pPr marL="1350020" indent="0">
-              <a:buNone/>
-              <a:defRPr sz="1772"/>
+            <a:lvl3pPr marL="1439997" indent="0">
+              <a:buNone/>
+              <a:defRPr sz="1890"/>
             </a:lvl3pPr>
-            <a:lvl4pPr marL="2025030" indent="0">
-              <a:buNone/>
-              <a:defRPr sz="1476"/>
+            <a:lvl4pPr marL="2159996" indent="0">
+              <a:buNone/>
+              <a:defRPr sz="1575"/>
             </a:lvl4pPr>
-            <a:lvl5pPr marL="2700040" indent="0">
-              <a:buNone/>
-              <a:defRPr sz="1476"/>
+            <a:lvl5pPr marL="2879994" indent="0">
+              <a:buNone/>
+              <a:defRPr sz="1575"/>
             </a:lvl5pPr>
-            <a:lvl6pPr marL="3375050" indent="0">
-              <a:buNone/>
-              <a:defRPr sz="1476"/>
+            <a:lvl6pPr marL="3599993" indent="0">
+              <a:buNone/>
+              <a:defRPr sz="1575"/>
             </a:lvl6pPr>
-            <a:lvl7pPr marL="4050060" indent="0">
-              <a:buNone/>
-              <a:defRPr sz="1476"/>
+            <a:lvl7pPr marL="4319991" indent="0">
+              <a:buNone/>
+              <a:defRPr sz="1575"/>
             </a:lvl7pPr>
-            <a:lvl8pPr marL="4725071" indent="0">
-              <a:buNone/>
-              <a:defRPr sz="1476"/>
+            <a:lvl8pPr marL="5039990" indent="0">
+              <a:buNone/>
+              <a:defRPr sz="1575"/>
             </a:lvl8pPr>
-            <a:lvl9pPr marL="5400081" indent="0">
-              <a:buNone/>
-              <a:defRPr sz="1476"/>
+            <a:lvl9pPr marL="5759988" indent="0">
+              <a:buNone/>
+              <a:defRPr sz="1575"/>
             </a:lvl9pPr>
           </a:lstStyle>
           <a:p>
@@ -2098,7 +2096,7 @@
           <a:p>
             <a:fld id="{CA1BB51F-BFC6-4DD3-8C2A-5B21FD6F69C3}" type="datetimeFigureOut">
               <a:rPr lang="en-SE" smtClean="0"/>
-              <a:t>10/04/2023</a:t>
+              <a:t>10/03/2023</a:t>
             </a:fld>
             <a:endParaRPr lang="en-SE"/>
           </a:p>
@@ -2149,7 +2147,7 @@
     </p:spTree>
     <p:extLst>
       <p:ext uri="{BB962C8B-B14F-4D97-AF65-F5344CB8AC3E}">
-        <p14:creationId xmlns:p14="http://schemas.microsoft.com/office/powerpoint/2010/main" val="4114463716"/>
+        <p14:creationId xmlns:p14="http://schemas.microsoft.com/office/powerpoint/2010/main" val="448018901"/>
       </p:ext>
     </p:extLst>
   </p:cSld>
@@ -2188,15 +2186,15 @@
         </p:nvSpPr>
         <p:spPr>
           <a:xfrm>
-            <a:off x="1239891" y="719984"/>
-            <a:ext cx="5805682" cy="2519945"/>
+            <a:off x="1115890" y="719984"/>
+            <a:ext cx="5225063" cy="2519945"/>
           </a:xfrm>
         </p:spPr>
         <p:txBody>
           <a:bodyPr anchor="b"/>
           <a:lstStyle>
             <a:lvl1pPr>
-              <a:defRPr sz="4724"/>
+              <a:defRPr sz="5039"/>
             </a:lvl1pPr>
           </a:lstStyle>
           <a:p>
@@ -2220,8 +2218,8 @@
         </p:nvSpPr>
         <p:spPr>
           <a:xfrm>
-            <a:off x="7652626" y="1554966"/>
-            <a:ext cx="9112836" cy="7674832"/>
+            <a:off x="6887296" y="1554968"/>
+            <a:ext cx="8201472" cy="7674832"/>
           </a:xfrm>
         </p:spPr>
         <p:txBody>
@@ -2229,39 +2227,39 @@
           <a:lstStyle>
             <a:lvl1pPr marL="0" indent="0">
               <a:buNone/>
-              <a:defRPr sz="4724"/>
+              <a:defRPr sz="5039"/>
             </a:lvl1pPr>
-            <a:lvl2pPr marL="675010" indent="0">
-              <a:buNone/>
-              <a:defRPr sz="4134"/>
+            <a:lvl2pPr marL="719999" indent="0">
+              <a:buNone/>
+              <a:defRPr sz="4409"/>
             </a:lvl2pPr>
-            <a:lvl3pPr marL="1350020" indent="0">
-              <a:buNone/>
-              <a:defRPr sz="3543"/>
+            <a:lvl3pPr marL="1439997" indent="0">
+              <a:buNone/>
+              <a:defRPr sz="3780"/>
             </a:lvl3pPr>
-            <a:lvl4pPr marL="2025030" indent="0">
-              <a:buNone/>
-              <a:defRPr sz="2953"/>
+            <a:lvl4pPr marL="2159996" indent="0">
+              <a:buNone/>
+              <a:defRPr sz="3150"/>
             </a:lvl4pPr>
-            <a:lvl5pPr marL="2700040" indent="0">
-              <a:buNone/>
-              <a:defRPr sz="2953"/>
+            <a:lvl5pPr marL="2879994" indent="0">
+              <a:buNone/>
+              <a:defRPr sz="3150"/>
             </a:lvl5pPr>
-            <a:lvl6pPr marL="3375050" indent="0">
-              <a:buNone/>
-              <a:defRPr sz="2953"/>
+            <a:lvl6pPr marL="3599993" indent="0">
+              <a:buNone/>
+              <a:defRPr sz="3150"/>
             </a:lvl6pPr>
-            <a:lvl7pPr marL="4050060" indent="0">
-              <a:buNone/>
-              <a:defRPr sz="2953"/>
+            <a:lvl7pPr marL="4319991" indent="0">
+              <a:buNone/>
+              <a:defRPr sz="3150"/>
             </a:lvl7pPr>
-            <a:lvl8pPr marL="4725071" indent="0">
-              <a:buNone/>
-              <a:defRPr sz="2953"/>
+            <a:lvl8pPr marL="5039990" indent="0">
+              <a:buNone/>
+              <a:defRPr sz="3150"/>
             </a:lvl8pPr>
-            <a:lvl9pPr marL="5400081" indent="0">
-              <a:buNone/>
-              <a:defRPr sz="2953"/>
+            <a:lvl9pPr marL="5759988" indent="0">
+              <a:buNone/>
+              <a:defRPr sz="3150"/>
             </a:lvl9pPr>
           </a:lstStyle>
           <a:p>
@@ -2285,8 +2283,8 @@
         </p:nvSpPr>
         <p:spPr>
           <a:xfrm>
-            <a:off x="1239891" y="3239929"/>
-            <a:ext cx="5805682" cy="6002369"/>
+            <a:off x="1115890" y="3239929"/>
+            <a:ext cx="5225063" cy="6002369"/>
           </a:xfrm>
         </p:spPr>
         <p:txBody>
@@ -2294,39 +2292,39 @@
           <a:lstStyle>
             <a:lvl1pPr marL="0" indent="0">
               <a:buNone/>
-              <a:defRPr sz="2362"/>
+              <a:defRPr sz="2520"/>
             </a:lvl1pPr>
-            <a:lvl2pPr marL="675010" indent="0">
-              <a:buNone/>
-              <a:defRPr sz="2067"/>
+            <a:lvl2pPr marL="719999" indent="0">
+              <a:buNone/>
+              <a:defRPr sz="2205"/>
             </a:lvl2pPr>
-            <a:lvl3pPr marL="1350020" indent="0">
-              <a:buNone/>
-              <a:defRPr sz="1772"/>
+            <a:lvl3pPr marL="1439997" indent="0">
+              <a:buNone/>
+              <a:defRPr sz="1890"/>
             </a:lvl3pPr>
-            <a:lvl4pPr marL="2025030" indent="0">
-              <a:buNone/>
-              <a:defRPr sz="1476"/>
+            <a:lvl4pPr marL="2159996" indent="0">
+              <a:buNone/>
+              <a:defRPr sz="1575"/>
             </a:lvl4pPr>
-            <a:lvl5pPr marL="2700040" indent="0">
-              <a:buNone/>
-              <a:defRPr sz="1476"/>
+            <a:lvl5pPr marL="2879994" indent="0">
+              <a:buNone/>
+              <a:defRPr sz="1575"/>
             </a:lvl5pPr>
-            <a:lvl6pPr marL="3375050" indent="0">
-              <a:buNone/>
-              <a:defRPr sz="1476"/>
+            <a:lvl6pPr marL="3599993" indent="0">
+              <a:buNone/>
+              <a:defRPr sz="1575"/>
             </a:lvl6pPr>
-            <a:lvl7pPr marL="4050060" indent="0">
-              <a:buNone/>
-              <a:defRPr sz="1476"/>
+            <a:lvl7pPr marL="4319991" indent="0">
+              <a:buNone/>
+              <a:defRPr sz="1575"/>
             </a:lvl7pPr>
-            <a:lvl8pPr marL="4725071" indent="0">
-              <a:buNone/>
-              <a:defRPr sz="1476"/>
+            <a:lvl8pPr marL="5039990" indent="0">
+              <a:buNone/>
+              <a:defRPr sz="1575"/>
             </a:lvl8pPr>
-            <a:lvl9pPr marL="5400081" indent="0">
-              <a:buNone/>
-              <a:defRPr sz="1476"/>
+            <a:lvl9pPr marL="5759988" indent="0">
+              <a:buNone/>
+              <a:defRPr sz="1575"/>
             </a:lvl9pPr>
           </a:lstStyle>
           <a:p>
@@ -2355,7 +2353,7 @@
           <a:p>
             <a:fld id="{CA1BB51F-BFC6-4DD3-8C2A-5B21FD6F69C3}" type="datetimeFigureOut">
               <a:rPr lang="en-SE" smtClean="0"/>
-              <a:t>10/04/2023</a:t>
+              <a:t>10/03/2023</a:t>
             </a:fld>
             <a:endParaRPr lang="en-SE"/>
           </a:p>
@@ -2406,7 +2404,7 @@
     </p:spTree>
     <p:extLst>
       <p:ext uri="{BB962C8B-B14F-4D97-AF65-F5344CB8AC3E}">
-        <p14:creationId xmlns:p14="http://schemas.microsoft.com/office/powerpoint/2010/main" val="28970552"/>
+        <p14:creationId xmlns:p14="http://schemas.microsoft.com/office/powerpoint/2010/main" val="3437152585"/>
       </p:ext>
     </p:extLst>
   </p:cSld>
@@ -2450,8 +2448,8 @@
         </p:nvSpPr>
         <p:spPr>
           <a:xfrm>
-            <a:off x="1237546" y="574988"/>
-            <a:ext cx="15525572" cy="2087455"/>
+            <a:off x="1113780" y="574990"/>
+            <a:ext cx="13972878" cy="2087455"/>
           </a:xfrm>
           <a:prstGeom prst="rect">
             <a:avLst/>
@@ -2483,8 +2481,8 @@
         </p:nvSpPr>
         <p:spPr>
           <a:xfrm>
-            <a:off x="1237546" y="2874937"/>
-            <a:ext cx="15525572" cy="6852350"/>
+            <a:off x="1113780" y="2874937"/>
+            <a:ext cx="13972878" cy="6852350"/>
           </a:xfrm>
           <a:prstGeom prst="rect">
             <a:avLst/>
@@ -2545,8 +2543,8 @@
         </p:nvSpPr>
         <p:spPr>
           <a:xfrm>
-            <a:off x="1237546" y="10009781"/>
-            <a:ext cx="4050149" cy="574987"/>
+            <a:off x="1113780" y="10009783"/>
+            <a:ext cx="3645099" cy="574987"/>
           </a:xfrm>
           <a:prstGeom prst="rect">
             <a:avLst/>
@@ -2556,7 +2554,7 @@
           <a:bodyPr vert="horz" lIns="91440" tIns="45720" rIns="91440" bIns="45720" rtlCol="0" anchor="ctr"/>
           <a:lstStyle>
             <a:lvl1pPr algn="l">
-              <a:defRPr sz="1772">
+              <a:defRPr sz="1890">
                 <a:solidFill>
                   <a:schemeClr val="tx1">
                     <a:tint val="75000"/>
@@ -2568,7 +2566,7 @@
           <a:p>
             <a:fld id="{CA1BB51F-BFC6-4DD3-8C2A-5B21FD6F69C3}" type="datetimeFigureOut">
               <a:rPr lang="en-SE" smtClean="0"/>
-              <a:t>10/04/2023</a:t>
+              <a:t>10/03/2023</a:t>
             </a:fld>
             <a:endParaRPr lang="en-SE"/>
           </a:p>
@@ -2586,8 +2584,8 @@
         </p:nvSpPr>
         <p:spPr>
           <a:xfrm>
-            <a:off x="5962720" y="10009781"/>
-            <a:ext cx="6075224" cy="574987"/>
+            <a:off x="5366395" y="10009783"/>
+            <a:ext cx="5467648" cy="574987"/>
           </a:xfrm>
           <a:prstGeom prst="rect">
             <a:avLst/>
@@ -2597,7 +2595,7 @@
           <a:bodyPr vert="horz" lIns="91440" tIns="45720" rIns="91440" bIns="45720" rtlCol="0" anchor="ctr"/>
           <a:lstStyle>
             <a:lvl1pPr algn="ctr">
-              <a:defRPr sz="1772">
+              <a:defRPr sz="1890">
                 <a:solidFill>
                   <a:schemeClr val="tx1">
                     <a:tint val="75000"/>
@@ -2623,8 +2621,8 @@
         </p:nvSpPr>
         <p:spPr>
           <a:xfrm>
-            <a:off x="12712968" y="10009781"/>
-            <a:ext cx="4050149" cy="574987"/>
+            <a:off x="11441559" y="10009783"/>
+            <a:ext cx="3645099" cy="574987"/>
           </a:xfrm>
           <a:prstGeom prst="rect">
             <a:avLst/>
@@ -2634,7 +2632,7 @@
           <a:bodyPr vert="horz" lIns="91440" tIns="45720" rIns="91440" bIns="45720" rtlCol="0" anchor="ctr"/>
           <a:lstStyle>
             <a:lvl1pPr algn="r">
-              <a:defRPr sz="1772">
+              <a:defRPr sz="1890">
                 <a:solidFill>
                   <a:schemeClr val="tx1">
                     <a:tint val="75000"/>
@@ -2655,27 +2653,27 @@
     </p:spTree>
     <p:extLst>
       <p:ext uri="{BB962C8B-B14F-4D97-AF65-F5344CB8AC3E}">
-        <p14:creationId xmlns:p14="http://schemas.microsoft.com/office/powerpoint/2010/main" val="644986390"/>
+        <p14:creationId xmlns:p14="http://schemas.microsoft.com/office/powerpoint/2010/main" val="3960267719"/>
       </p:ext>
     </p:extLst>
   </p:cSld>
   <p:clrMap bg1="lt1" tx1="dk1" bg2="lt2" tx2="dk2" accent1="accent1" accent2="accent2" accent3="accent3" accent4="accent4" accent5="accent5" accent6="accent6" hlink="hlink" folHlink="folHlink"/>
   <p:sldLayoutIdLst>
-    <p:sldLayoutId id="2147483709" r:id="rId1"/>
-    <p:sldLayoutId id="2147483710" r:id="rId2"/>
-    <p:sldLayoutId id="2147483711" r:id="rId3"/>
-    <p:sldLayoutId id="2147483712" r:id="rId4"/>
-    <p:sldLayoutId id="2147483713" r:id="rId5"/>
-    <p:sldLayoutId id="2147483714" r:id="rId6"/>
-    <p:sldLayoutId id="2147483715" r:id="rId7"/>
-    <p:sldLayoutId id="2147483716" r:id="rId8"/>
-    <p:sldLayoutId id="2147483717" r:id="rId9"/>
-    <p:sldLayoutId id="2147483718" r:id="rId10"/>
-    <p:sldLayoutId id="2147483719" r:id="rId11"/>
+    <p:sldLayoutId id="2147483805" r:id="rId1"/>
+    <p:sldLayoutId id="2147483806" r:id="rId2"/>
+    <p:sldLayoutId id="2147483807" r:id="rId3"/>
+    <p:sldLayoutId id="2147483808" r:id="rId4"/>
+    <p:sldLayoutId id="2147483809" r:id="rId5"/>
+    <p:sldLayoutId id="2147483810" r:id="rId6"/>
+    <p:sldLayoutId id="2147483811" r:id="rId7"/>
+    <p:sldLayoutId id="2147483812" r:id="rId8"/>
+    <p:sldLayoutId id="2147483813" r:id="rId9"/>
+    <p:sldLayoutId id="2147483814" r:id="rId10"/>
+    <p:sldLayoutId id="2147483815" r:id="rId11"/>
   </p:sldLayoutIdLst>
   <p:txStyles>
     <p:titleStyle>
-      <a:lvl1pPr algn="l" defTabSz="1350020" rtl="0" eaLnBrk="1" latinLnBrk="0" hangingPunct="1">
+      <a:lvl1pPr algn="l" defTabSz="1439997" rtl="0" eaLnBrk="1" latinLnBrk="0" hangingPunct="1">
         <a:lnSpc>
           <a:spcPct val="90000"/>
         </a:lnSpc>
@@ -2683,7 +2681,7 @@
           <a:spcPct val="0"/>
         </a:spcBef>
         <a:buNone/>
-        <a:defRPr sz="6496" kern="1200">
+        <a:defRPr sz="6929" kern="1200">
           <a:solidFill>
             <a:schemeClr val="tx1"/>
           </a:solidFill>
@@ -2694,16 +2692,16 @@
       </a:lvl1pPr>
     </p:titleStyle>
     <p:bodyStyle>
-      <a:lvl1pPr marL="337505" indent="-337505" algn="l" defTabSz="1350020" rtl="0" eaLnBrk="1" latinLnBrk="0" hangingPunct="1">
+      <a:lvl1pPr marL="359999" indent="-359999" algn="l" defTabSz="1439997" rtl="0" eaLnBrk="1" latinLnBrk="0" hangingPunct="1">
         <a:lnSpc>
           <a:spcPct val="90000"/>
         </a:lnSpc>
         <a:spcBef>
-          <a:spcPts val="1476"/>
+          <a:spcPts val="1575"/>
         </a:spcBef>
         <a:buFont typeface="Arial" panose="020B0604020202020204" pitchFamily="34" charset="0"/>
         <a:buChar char="•"/>
-        <a:defRPr sz="4134" kern="1200">
+        <a:defRPr sz="4409" kern="1200">
           <a:solidFill>
             <a:schemeClr val="tx1"/>
           </a:solidFill>
@@ -2712,16 +2710,16 @@
           <a:cs typeface="+mn-cs"/>
         </a:defRPr>
       </a:lvl1pPr>
-      <a:lvl2pPr marL="1012515" indent="-337505" algn="l" defTabSz="1350020" rtl="0" eaLnBrk="1" latinLnBrk="0" hangingPunct="1">
+      <a:lvl2pPr marL="1079998" indent="-359999" algn="l" defTabSz="1439997" rtl="0" eaLnBrk="1" latinLnBrk="0" hangingPunct="1">
         <a:lnSpc>
           <a:spcPct val="90000"/>
         </a:lnSpc>
         <a:spcBef>
-          <a:spcPts val="738"/>
+          <a:spcPts val="787"/>
         </a:spcBef>
         <a:buFont typeface="Arial" panose="020B0604020202020204" pitchFamily="34" charset="0"/>
         <a:buChar char="•"/>
-        <a:defRPr sz="3543" kern="1200">
+        <a:defRPr sz="3780" kern="1200">
           <a:solidFill>
             <a:schemeClr val="tx1"/>
           </a:solidFill>
@@ -2730,16 +2728,16 @@
           <a:cs typeface="+mn-cs"/>
         </a:defRPr>
       </a:lvl2pPr>
-      <a:lvl3pPr marL="1687525" indent="-337505" algn="l" defTabSz="1350020" rtl="0" eaLnBrk="1" latinLnBrk="0" hangingPunct="1">
+      <a:lvl3pPr marL="1799996" indent="-359999" algn="l" defTabSz="1439997" rtl="0" eaLnBrk="1" latinLnBrk="0" hangingPunct="1">
         <a:lnSpc>
           <a:spcPct val="90000"/>
         </a:lnSpc>
         <a:spcBef>
-          <a:spcPts val="738"/>
+          <a:spcPts val="787"/>
         </a:spcBef>
         <a:buFont typeface="Arial" panose="020B0604020202020204" pitchFamily="34" charset="0"/>
         <a:buChar char="•"/>
-        <a:defRPr sz="2953" kern="1200">
+        <a:defRPr sz="3150" kern="1200">
           <a:solidFill>
             <a:schemeClr val="tx1"/>
           </a:solidFill>
@@ -2748,16 +2746,16 @@
           <a:cs typeface="+mn-cs"/>
         </a:defRPr>
       </a:lvl3pPr>
-      <a:lvl4pPr marL="2362535" indent="-337505" algn="l" defTabSz="1350020" rtl="0" eaLnBrk="1" latinLnBrk="0" hangingPunct="1">
+      <a:lvl4pPr marL="2519995" indent="-359999" algn="l" defTabSz="1439997" rtl="0" eaLnBrk="1" latinLnBrk="0" hangingPunct="1">
         <a:lnSpc>
           <a:spcPct val="90000"/>
         </a:lnSpc>
         <a:spcBef>
-          <a:spcPts val="738"/>
+          <a:spcPts val="787"/>
         </a:spcBef>
         <a:buFont typeface="Arial" panose="020B0604020202020204" pitchFamily="34" charset="0"/>
         <a:buChar char="•"/>
-        <a:defRPr sz="2658" kern="1200">
+        <a:defRPr sz="2835" kern="1200">
           <a:solidFill>
             <a:schemeClr val="tx1"/>
           </a:solidFill>
@@ -2766,16 +2764,16 @@
           <a:cs typeface="+mn-cs"/>
         </a:defRPr>
       </a:lvl4pPr>
-      <a:lvl5pPr marL="3037545" indent="-337505" algn="l" defTabSz="1350020" rtl="0" eaLnBrk="1" latinLnBrk="0" hangingPunct="1">
+      <a:lvl5pPr marL="3239994" indent="-359999" algn="l" defTabSz="1439997" rtl="0" eaLnBrk="1" latinLnBrk="0" hangingPunct="1">
         <a:lnSpc>
           <a:spcPct val="90000"/>
         </a:lnSpc>
         <a:spcBef>
-          <a:spcPts val="738"/>
+          <a:spcPts val="787"/>
         </a:spcBef>
         <a:buFont typeface="Arial" panose="020B0604020202020204" pitchFamily="34" charset="0"/>
         <a:buChar char="•"/>
-        <a:defRPr sz="2658" kern="1200">
+        <a:defRPr sz="2835" kern="1200">
           <a:solidFill>
             <a:schemeClr val="tx1"/>
           </a:solidFill>
@@ -2784,16 +2782,16 @@
           <a:cs typeface="+mn-cs"/>
         </a:defRPr>
       </a:lvl5pPr>
-      <a:lvl6pPr marL="3712555" indent="-337505" algn="l" defTabSz="1350020" rtl="0" eaLnBrk="1" latinLnBrk="0" hangingPunct="1">
+      <a:lvl6pPr marL="3959992" indent="-359999" algn="l" defTabSz="1439997" rtl="0" eaLnBrk="1" latinLnBrk="0" hangingPunct="1">
         <a:lnSpc>
           <a:spcPct val="90000"/>
         </a:lnSpc>
         <a:spcBef>
-          <a:spcPts val="738"/>
+          <a:spcPts val="787"/>
         </a:spcBef>
         <a:buFont typeface="Arial" panose="020B0604020202020204" pitchFamily="34" charset="0"/>
         <a:buChar char="•"/>
-        <a:defRPr sz="2658" kern="1200">
+        <a:defRPr sz="2835" kern="1200">
           <a:solidFill>
             <a:schemeClr val="tx1"/>
           </a:solidFill>
@@ -2802,16 +2800,16 @@
           <a:cs typeface="+mn-cs"/>
         </a:defRPr>
       </a:lvl6pPr>
-      <a:lvl7pPr marL="4387566" indent="-337505" algn="l" defTabSz="1350020" rtl="0" eaLnBrk="1" latinLnBrk="0" hangingPunct="1">
+      <a:lvl7pPr marL="4679991" indent="-359999" algn="l" defTabSz="1439997" rtl="0" eaLnBrk="1" latinLnBrk="0" hangingPunct="1">
         <a:lnSpc>
           <a:spcPct val="90000"/>
         </a:lnSpc>
         <a:spcBef>
-          <a:spcPts val="738"/>
+          <a:spcPts val="787"/>
         </a:spcBef>
         <a:buFont typeface="Arial" panose="020B0604020202020204" pitchFamily="34" charset="0"/>
         <a:buChar char="•"/>
-        <a:defRPr sz="2658" kern="1200">
+        <a:defRPr sz="2835" kern="1200">
           <a:solidFill>
             <a:schemeClr val="tx1"/>
           </a:solidFill>
@@ -2820,16 +2818,16 @@
           <a:cs typeface="+mn-cs"/>
         </a:defRPr>
       </a:lvl7pPr>
-      <a:lvl8pPr marL="5062576" indent="-337505" algn="l" defTabSz="1350020" rtl="0" eaLnBrk="1" latinLnBrk="0" hangingPunct="1">
+      <a:lvl8pPr marL="5399989" indent="-359999" algn="l" defTabSz="1439997" rtl="0" eaLnBrk="1" latinLnBrk="0" hangingPunct="1">
         <a:lnSpc>
           <a:spcPct val="90000"/>
         </a:lnSpc>
         <a:spcBef>
-          <a:spcPts val="738"/>
+          <a:spcPts val="787"/>
         </a:spcBef>
         <a:buFont typeface="Arial" panose="020B0604020202020204" pitchFamily="34" charset="0"/>
         <a:buChar char="•"/>
-        <a:defRPr sz="2658" kern="1200">
+        <a:defRPr sz="2835" kern="1200">
           <a:solidFill>
             <a:schemeClr val="tx1"/>
           </a:solidFill>
@@ -2838,16 +2836,16 @@
           <a:cs typeface="+mn-cs"/>
         </a:defRPr>
       </a:lvl8pPr>
-      <a:lvl9pPr marL="5737586" indent="-337505" algn="l" defTabSz="1350020" rtl="0" eaLnBrk="1" latinLnBrk="0" hangingPunct="1">
+      <a:lvl9pPr marL="6119988" indent="-359999" algn="l" defTabSz="1439997" rtl="0" eaLnBrk="1" latinLnBrk="0" hangingPunct="1">
         <a:lnSpc>
           <a:spcPct val="90000"/>
         </a:lnSpc>
         <a:spcBef>
-          <a:spcPts val="738"/>
+          <a:spcPts val="787"/>
         </a:spcBef>
         <a:buFont typeface="Arial" panose="020B0604020202020204" pitchFamily="34" charset="0"/>
         <a:buChar char="•"/>
-        <a:defRPr sz="2658" kern="1200">
+        <a:defRPr sz="2835" kern="1200">
           <a:solidFill>
             <a:schemeClr val="tx1"/>
           </a:solidFill>
@@ -2861,8 +2859,8 @@
       <a:defPPr>
         <a:defRPr lang="en-US"/>
       </a:defPPr>
-      <a:lvl1pPr marL="0" algn="l" defTabSz="1350020" rtl="0" eaLnBrk="1" latinLnBrk="0" hangingPunct="1">
-        <a:defRPr sz="2658" kern="1200">
+      <a:lvl1pPr marL="0" algn="l" defTabSz="1439997" rtl="0" eaLnBrk="1" latinLnBrk="0" hangingPunct="1">
+        <a:defRPr sz="2835" kern="1200">
           <a:solidFill>
             <a:schemeClr val="tx1"/>
           </a:solidFill>
@@ -2871,8 +2869,8 @@
           <a:cs typeface="+mn-cs"/>
         </a:defRPr>
       </a:lvl1pPr>
-      <a:lvl2pPr marL="675010" algn="l" defTabSz="1350020" rtl="0" eaLnBrk="1" latinLnBrk="0" hangingPunct="1">
-        <a:defRPr sz="2658" kern="1200">
+      <a:lvl2pPr marL="719999" algn="l" defTabSz="1439997" rtl="0" eaLnBrk="1" latinLnBrk="0" hangingPunct="1">
+        <a:defRPr sz="2835" kern="1200">
           <a:solidFill>
             <a:schemeClr val="tx1"/>
           </a:solidFill>
@@ -2881,8 +2879,8 @@
           <a:cs typeface="+mn-cs"/>
         </a:defRPr>
       </a:lvl2pPr>
-      <a:lvl3pPr marL="1350020" algn="l" defTabSz="1350020" rtl="0" eaLnBrk="1" latinLnBrk="0" hangingPunct="1">
-        <a:defRPr sz="2658" kern="1200">
+      <a:lvl3pPr marL="1439997" algn="l" defTabSz="1439997" rtl="0" eaLnBrk="1" latinLnBrk="0" hangingPunct="1">
+        <a:defRPr sz="2835" kern="1200">
           <a:solidFill>
             <a:schemeClr val="tx1"/>
           </a:solidFill>
@@ -2891,8 +2889,8 @@
           <a:cs typeface="+mn-cs"/>
         </a:defRPr>
       </a:lvl3pPr>
-      <a:lvl4pPr marL="2025030" algn="l" defTabSz="1350020" rtl="0" eaLnBrk="1" latinLnBrk="0" hangingPunct="1">
-        <a:defRPr sz="2658" kern="1200">
+      <a:lvl4pPr marL="2159996" algn="l" defTabSz="1439997" rtl="0" eaLnBrk="1" latinLnBrk="0" hangingPunct="1">
+        <a:defRPr sz="2835" kern="1200">
           <a:solidFill>
             <a:schemeClr val="tx1"/>
           </a:solidFill>
@@ -2901,8 +2899,8 @@
           <a:cs typeface="+mn-cs"/>
         </a:defRPr>
       </a:lvl4pPr>
-      <a:lvl5pPr marL="2700040" algn="l" defTabSz="1350020" rtl="0" eaLnBrk="1" latinLnBrk="0" hangingPunct="1">
-        <a:defRPr sz="2658" kern="1200">
+      <a:lvl5pPr marL="2879994" algn="l" defTabSz="1439997" rtl="0" eaLnBrk="1" latinLnBrk="0" hangingPunct="1">
+        <a:defRPr sz="2835" kern="1200">
           <a:solidFill>
             <a:schemeClr val="tx1"/>
           </a:solidFill>
@@ -2911,8 +2909,8 @@
           <a:cs typeface="+mn-cs"/>
         </a:defRPr>
       </a:lvl5pPr>
-      <a:lvl6pPr marL="3375050" algn="l" defTabSz="1350020" rtl="0" eaLnBrk="1" latinLnBrk="0" hangingPunct="1">
-        <a:defRPr sz="2658" kern="1200">
+      <a:lvl6pPr marL="3599993" algn="l" defTabSz="1439997" rtl="0" eaLnBrk="1" latinLnBrk="0" hangingPunct="1">
+        <a:defRPr sz="2835" kern="1200">
           <a:solidFill>
             <a:schemeClr val="tx1"/>
           </a:solidFill>
@@ -2921,8 +2919,8 @@
           <a:cs typeface="+mn-cs"/>
         </a:defRPr>
       </a:lvl6pPr>
-      <a:lvl7pPr marL="4050060" algn="l" defTabSz="1350020" rtl="0" eaLnBrk="1" latinLnBrk="0" hangingPunct="1">
-        <a:defRPr sz="2658" kern="1200">
+      <a:lvl7pPr marL="4319991" algn="l" defTabSz="1439997" rtl="0" eaLnBrk="1" latinLnBrk="0" hangingPunct="1">
+        <a:defRPr sz="2835" kern="1200">
           <a:solidFill>
             <a:schemeClr val="tx1"/>
           </a:solidFill>
@@ -2931,8 +2929,8 @@
           <a:cs typeface="+mn-cs"/>
         </a:defRPr>
       </a:lvl7pPr>
-      <a:lvl8pPr marL="4725071" algn="l" defTabSz="1350020" rtl="0" eaLnBrk="1" latinLnBrk="0" hangingPunct="1">
-        <a:defRPr sz="2658" kern="1200">
+      <a:lvl8pPr marL="5039990" algn="l" defTabSz="1439997" rtl="0" eaLnBrk="1" latinLnBrk="0" hangingPunct="1">
+        <a:defRPr sz="2835" kern="1200">
           <a:solidFill>
             <a:schemeClr val="tx1"/>
           </a:solidFill>
@@ -2941,8 +2939,8 @@
           <a:cs typeface="+mn-cs"/>
         </a:defRPr>
       </a:lvl8pPr>
-      <a:lvl9pPr marL="5400081" algn="l" defTabSz="1350020" rtl="0" eaLnBrk="1" latinLnBrk="0" hangingPunct="1">
-        <a:defRPr sz="2658" kern="1200">
+      <a:lvl9pPr marL="5759988" algn="l" defTabSz="1439997" rtl="0" eaLnBrk="1" latinLnBrk="0" hangingPunct="1">
+        <a:defRPr sz="2835" kern="1200">
           <a:solidFill>
             <a:schemeClr val="tx1"/>
           </a:solidFill>
@@ -2975,10 +2973,10 @@
       </p:grpSpPr>
       <p:pic>
         <p:nvPicPr>
-          <p:cNvPr id="3" name="图片 2">
+          <p:cNvPr id="4" name="图片 3">
             <a:extLst>
               <a:ext uri="{FF2B5EF4-FFF2-40B4-BE49-F238E27FC236}">
-                <a16:creationId xmlns:a16="http://schemas.microsoft.com/office/drawing/2014/main" id="{1AF4A27E-93D3-1252-6326-6185796A5257}"/>
+                <a16:creationId xmlns:a16="http://schemas.microsoft.com/office/drawing/2014/main" id="{D4F85FAD-8D65-C9C5-559D-2831ACB05A67}"/>
               </a:ext>
             </a:extLst>
           </p:cNvPr>
@@ -2989,13 +2987,13 @@
         </p:nvPicPr>
         <p:blipFill rotWithShape="1">
           <a:blip r:embed="rId2"/>
-          <a:srcRect l="-1" r="219"/>
+          <a:srcRect r="471" b="574"/>
           <a:stretch/>
         </p:blipFill>
         <p:spPr>
           <a:xfrm>
-            <a:off x="0" y="-1"/>
-            <a:ext cx="17287875" cy="10799763"/>
+            <a:off x="0" y="0"/>
+            <a:ext cx="15927817" cy="10485113"/>
           </a:xfrm>
           <a:prstGeom prst="rect">
             <a:avLst/>

</xml_diff>